<commit_message>
fixed the code box
</commit_message>
<xml_diff>
--- a/Document-Templates/SoftUni-Creative-PowerPoint-Template-Nov-2019.pptx
+++ b/Document-Templates/SoftUni-Creative-PowerPoint-Template-Nov-2019.pptx
@@ -5,10 +5,10 @@
     <p:sldMasterId id="2147483675" r:id="rId1"/>
   </p:sldMasterIdLst>
   <p:notesMasterIdLst>
-    <p:notesMasterId r:id="rId18"/>
+    <p:notesMasterId r:id="rId19"/>
   </p:notesMasterIdLst>
   <p:handoutMasterIdLst>
-    <p:handoutMasterId r:id="rId19"/>
+    <p:handoutMasterId r:id="rId20"/>
   </p:handoutMasterIdLst>
   <p:sldIdLst>
     <p:sldId id="269" r:id="rId2"/>
@@ -22,11 +22,12 @@
     <p:sldId id="267" r:id="rId10"/>
     <p:sldId id="262" r:id="rId11"/>
     <p:sldId id="494" r:id="rId12"/>
-    <p:sldId id="349" r:id="rId13"/>
-    <p:sldId id="264" r:id="rId14"/>
-    <p:sldId id="270" r:id="rId15"/>
-    <p:sldId id="493" r:id="rId16"/>
-    <p:sldId id="497" r:id="rId17"/>
+    <p:sldId id="499" r:id="rId13"/>
+    <p:sldId id="349" r:id="rId14"/>
+    <p:sldId id="264" r:id="rId15"/>
+    <p:sldId id="270" r:id="rId16"/>
+    <p:sldId id="493" r:id="rId17"/>
+    <p:sldId id="497" r:id="rId18"/>
   </p:sldIdLst>
   <p:sldSz cx="12192000" cy="6858000"/>
   <p:notesSz cx="6858000" cy="9144000"/>
@@ -149,6 +150,7 @@
             <p14:sldId id="267"/>
             <p14:sldId id="262"/>
             <p14:sldId id="494"/>
+            <p14:sldId id="499"/>
           </p14:sldIdLst>
         </p14:section>
         <p14:section name="Conclusion" id="{10E03AB1-9AA8-4E86-9A64-D741901E50A2}">
@@ -277,7 +279,7 @@
           <a:p>
             <a:fld id="{4E087215-0C8F-4762-A664-737A353EC9A4}" type="datetimeFigureOut">
               <a:rPr lang="bg-BG" smtClean="0"/>
-              <a:t>12.11.2019 г.</a:t>
+              <a:t>21.10.2020 г.</a:t>
             </a:fld>
             <a:endParaRPr lang="bg-BG"/>
           </a:p>
@@ -454,7 +456,7 @@
           <a:p>
             <a:fld id="{72D84649-876A-46C9-8472-14CB09C070D8}" type="datetimeFigureOut">
               <a:rPr lang="en-US" smtClean="0"/>
-              <a:t>12-Nov-19</a:t>
+              <a:t>21-Oct-20</a:t>
             </a:fld>
             <a:endParaRPr lang="en-US"/>
           </a:p>
@@ -1123,7 +1125,7 @@
             <a:fld id="{3EBA5BD7-F043-4D1B-AA17-CD412FC534DE}" type="slidenum">
               <a:rPr lang="en-US" smtClean="0"/>
               <a:pPr/>
-              <a:t>12</a:t>
+              <a:t>13</a:t>
             </a:fld>
             <a:endParaRPr lang="en-US" dirty="0"/>
           </a:p>
@@ -1353,7 +1355,7 @@
             <a:fld id="{3EBA5BD7-F043-4D1B-AA17-CD412FC534DE}" type="slidenum">
               <a:rPr lang="en-US" smtClean="0"/>
               <a:pPr/>
-              <a:t>15</a:t>
+              <a:t>16</a:t>
             </a:fld>
             <a:endParaRPr lang="en-US" dirty="0"/>
           </a:p>
@@ -6596,7 +6598,7 @@
         <p:spPr>
           <a:xfrm>
             <a:off x="621234" y="2021154"/>
-            <a:ext cx="10949531" cy="1840541"/>
+            <a:ext cx="10949531" cy="1713583"/>
           </a:xfrm>
           <a:prstGeom prst="rect">
             <a:avLst/>
@@ -6622,7 +6624,7 @@
           <a:lstStyle>
             <a:lvl1pPr marL="0" indent="0" latinLnBrk="0">
               <a:lnSpc>
-                <a:spcPct val="120000"/>
+                <a:spcPct val="110000"/>
               </a:lnSpc>
               <a:spcBef>
                 <a:spcPts val="0"/>
@@ -9097,6 +9099,283 @@
       </p:grpSpPr>
       <p:sp>
         <p:nvSpPr>
+          <p:cNvPr id="2" name="Slide Number Placeholder 1">
+            <a:extLst>
+              <a:ext uri="{FF2B5EF4-FFF2-40B4-BE49-F238E27FC236}">
+                <a16:creationId xmlns:a16="http://schemas.microsoft.com/office/drawing/2014/main" id="{7EE694F5-BAF6-4034-90D7-95E1FB223C12}"/>
+              </a:ext>
+            </a:extLst>
+          </p:cNvPr>
+          <p:cNvSpPr>
+            <a:spLocks noGrp="1"/>
+          </p:cNvSpPr>
+          <p:nvPr>
+            <p:ph type="sldNum" sz="quarter" idx="4"/>
+          </p:nvPr>
+        </p:nvSpPr>
+        <p:spPr/>
+        <p:txBody>
+          <a:bodyPr/>
+          <a:lstStyle/>
+          <a:p>
+            <a:fld id="{C014DD1E-5D91-48A3-AD6D-45FBA980D106}" type="slidenum">
+              <a:rPr lang="en-US" smtClean="0"/>
+              <a:pPr/>
+              <a:t>12</a:t>
+            </a:fld>
+            <a:endParaRPr lang="en-US" dirty="0"/>
+          </a:p>
+        </p:txBody>
+      </p:sp>
+      <p:sp>
+        <p:nvSpPr>
+          <p:cNvPr id="19" name="Text Placeholder 18">
+            <a:extLst>
+              <a:ext uri="{FF2B5EF4-FFF2-40B4-BE49-F238E27FC236}">
+                <a16:creationId xmlns:a16="http://schemas.microsoft.com/office/drawing/2014/main" id="{869C34AC-A141-4566-BEDF-10917AE89DE5}"/>
+              </a:ext>
+            </a:extLst>
+          </p:cNvPr>
+          <p:cNvSpPr>
+            <a:spLocks noGrp="1"/>
+          </p:cNvSpPr>
+          <p:nvPr>
+            <p:ph type="body" sz="quarter" idx="10"/>
+          </p:nvPr>
+        </p:nvSpPr>
+        <p:spPr/>
+        <p:txBody>
+          <a:bodyPr/>
+          <a:lstStyle/>
+          <a:p>
+            <a:r>
+              <a:rPr lang="en-US" dirty="0"/>
+              <a:t>Source code example:</a:t>
+            </a:r>
+          </a:p>
+        </p:txBody>
+      </p:sp>
+      <p:sp>
+        <p:nvSpPr>
+          <p:cNvPr id="7" name="Text Placeholder 6">
+            <a:extLst>
+              <a:ext uri="{FF2B5EF4-FFF2-40B4-BE49-F238E27FC236}">
+                <a16:creationId xmlns:a16="http://schemas.microsoft.com/office/drawing/2014/main" id="{459E3494-3859-4F3A-B088-E743F39E39B3}"/>
+              </a:ext>
+            </a:extLst>
+          </p:cNvPr>
+          <p:cNvSpPr>
+            <a:spLocks noGrp="1"/>
+          </p:cNvSpPr>
+          <p:nvPr>
+            <p:ph type="body" sz="quarter" idx="11"/>
+          </p:nvPr>
+        </p:nvSpPr>
+        <p:spPr>
+          <a:xfrm>
+            <a:off x="621234" y="2021154"/>
+            <a:ext cx="10949531" cy="4434328"/>
+          </a:xfrm>
+        </p:spPr>
+        <p:txBody>
+          <a:bodyPr/>
+          <a:lstStyle/>
+          <a:p>
+            <a:pPr>
+              <a:spcBef>
+                <a:spcPts val="300"/>
+              </a:spcBef>
+              <a:spcAft>
+                <a:spcPts val="300"/>
+              </a:spcAft>
+            </a:pPr>
+            <a:r>
+              <a:rPr lang="en-US" sz="2800" noProof="1"/>
+              <a:t>class Abstract {</a:t>
+            </a:r>
+          </a:p>
+          <a:p>
+            <a:pPr>
+              <a:spcBef>
+                <a:spcPts val="300"/>
+              </a:spcBef>
+              <a:spcAft>
+                <a:spcPts val="300"/>
+              </a:spcAft>
+            </a:pPr>
+            <a:r>
+              <a:rPr lang="en-US" sz="2800" noProof="1"/>
+              <a:t>  constructor() {</a:t>
+            </a:r>
+          </a:p>
+          <a:p>
+            <a:pPr>
+              <a:spcBef>
+                <a:spcPts val="300"/>
+              </a:spcBef>
+              <a:spcAft>
+                <a:spcPts val="300"/>
+              </a:spcAft>
+            </a:pPr>
+            <a:r>
+              <a:rPr lang="en-US" sz="2800" noProof="1"/>
+              <a:t>    if (</a:t>
+            </a:r>
+            <a:r>
+              <a:rPr lang="en-US" sz="2800" noProof="1">
+                <a:solidFill>
+                  <a:schemeClr val="bg1">
+                    <a:lumMod val="75000"/>
+                  </a:schemeClr>
+                </a:solidFill>
+              </a:rPr>
+              <a:t>new.target </a:t>
+            </a:r>
+            <a:r>
+              <a:rPr lang="en-US" sz="2800" noProof="1"/>
+              <a:t>=== Abstract) {</a:t>
+            </a:r>
+          </a:p>
+          <a:p>
+            <a:pPr>
+              <a:spcBef>
+                <a:spcPts val="300"/>
+              </a:spcBef>
+              <a:spcAft>
+                <a:spcPts val="300"/>
+              </a:spcAft>
+            </a:pPr>
+            <a:r>
+              <a:rPr lang="en-US" sz="2800" noProof="1"/>
+              <a:t>      </a:t>
+            </a:r>
+            <a:r>
+              <a:rPr lang="en-US" sz="2800" noProof="1">
+                <a:solidFill>
+                  <a:schemeClr val="bg1">
+                    <a:lumMod val="75000"/>
+                  </a:schemeClr>
+                </a:solidFill>
+              </a:rPr>
+              <a:t>throw new TypeError</a:t>
+            </a:r>
+            <a:r>
+              <a:rPr lang="en-US" sz="2800" noProof="1"/>
+              <a:t>("Cannot construct Abstract</a:t>
+            </a:r>
+            <a:br>
+              <a:rPr lang="en-US" sz="2800" noProof="1"/>
+            </a:br>
+            <a:r>
+              <a:rPr lang="en-US" sz="2800" noProof="1"/>
+              <a:t>        instances directly");</a:t>
+            </a:r>
+            <a:br>
+              <a:rPr lang="en-US" sz="2800" noProof="1"/>
+            </a:br>
+            <a:r>
+              <a:rPr lang="en-US" sz="2800" noProof="1"/>
+              <a:t>    }</a:t>
+            </a:r>
+          </a:p>
+          <a:p>
+            <a:pPr>
+              <a:spcBef>
+                <a:spcPts val="300"/>
+              </a:spcBef>
+              <a:spcAft>
+                <a:spcPts val="300"/>
+              </a:spcAft>
+            </a:pPr>
+            <a:r>
+              <a:rPr lang="en-US" sz="2800" noProof="1"/>
+              <a:t>  }</a:t>
+            </a:r>
+          </a:p>
+          <a:p>
+            <a:pPr>
+              <a:spcBef>
+                <a:spcPts val="300"/>
+              </a:spcBef>
+              <a:spcAft>
+                <a:spcPts val="300"/>
+              </a:spcAft>
+            </a:pPr>
+            <a:r>
+              <a:rPr lang="en-US" sz="2800" noProof="1"/>
+              <a:t>}</a:t>
+            </a:r>
+          </a:p>
+        </p:txBody>
+      </p:sp>
+      <p:sp>
+        <p:nvSpPr>
+          <p:cNvPr id="18" name="Title 17">
+            <a:extLst>
+              <a:ext uri="{FF2B5EF4-FFF2-40B4-BE49-F238E27FC236}">
+                <a16:creationId xmlns:a16="http://schemas.microsoft.com/office/drawing/2014/main" id="{2FA6AB9A-A492-463D-93F5-91347D2B040A}"/>
+              </a:ext>
+            </a:extLst>
+          </p:cNvPr>
+          <p:cNvSpPr>
+            <a:spLocks noGrp="1"/>
+          </p:cNvSpPr>
+          <p:nvPr>
+            <p:ph type="title"/>
+          </p:nvPr>
+        </p:nvSpPr>
+        <p:spPr/>
+        <p:txBody>
+          <a:bodyPr/>
+          <a:lstStyle/>
+          <a:p>
+            <a:r>
+              <a:rPr lang="en-US" dirty="0"/>
+              <a:t>Sample Code</a:t>
+            </a:r>
+          </a:p>
+        </p:txBody>
+      </p:sp>
+    </p:spTree>
+    <p:extLst>
+      <p:ext uri="{BB962C8B-B14F-4D97-AF65-F5344CB8AC3E}">
+        <p14:creationId xmlns:p14="http://schemas.microsoft.com/office/powerpoint/2010/main" val="926806899"/>
+      </p:ext>
+    </p:extLst>
+  </p:cSld>
+  <p:clrMapOvr>
+    <a:masterClrMapping/>
+  </p:clrMapOvr>
+  <mc:AlternateContent xmlns:mc="http://schemas.openxmlformats.org/markup-compatibility/2006" xmlns:p14="http://schemas.microsoft.com/office/powerpoint/2010/main">
+    <mc:Choice Requires="p14">
+      <p:transition spd="slow" p14:dur="2000" advClick="0" advTm="5000"/>
+    </mc:Choice>
+    <mc:Fallback xmlns="">
+      <p:transition spd="slow" advClick="0" advTm="5000"/>
+    </mc:Fallback>
+  </mc:AlternateContent>
+</p:sld>
+</file>
+
+<file path=ppt/slides/slide13.xml><?xml version="1.0" encoding="utf-8"?>
+<p:sld xmlns:a="http://schemas.openxmlformats.org/drawingml/2006/main" xmlns:r="http://schemas.openxmlformats.org/officeDocument/2006/relationships" xmlns:p="http://schemas.openxmlformats.org/presentationml/2006/main">
+  <p:cSld>
+    <p:spTree>
+      <p:nvGrpSpPr>
+        <p:cNvPr id="1" name=""/>
+        <p:cNvGrpSpPr/>
+        <p:nvPr/>
+      </p:nvGrpSpPr>
+      <p:grpSpPr>
+        <a:xfrm>
+          <a:off x="0" y="0"/>
+          <a:ext cx="0" cy="0"/>
+          <a:chOff x="0" y="0"/>
+          <a:chExt cx="0" cy="0"/>
+        </a:xfrm>
+      </p:grpSpPr>
+      <p:sp>
+        <p:nvSpPr>
           <p:cNvPr id="17" name="Slide Number">
             <a:extLst>
               <a:ext uri="{FF2B5EF4-FFF2-40B4-BE49-F238E27FC236}">
@@ -9213,7 +9492,7 @@
             <a:fld id="{2BF067CD-8E6B-4360-9AA8-C5DF2A48A6D1}" type="slidenum">
               <a:rPr lang="en-US" smtClean="0"/>
               <a:pPr/>
-              <a:t>12</a:t>
+              <a:t>13</a:t>
             </a:fld>
             <a:endParaRPr lang="en-US" dirty="0"/>
           </a:p>
@@ -10043,7 +10322,7 @@
 </p:sld>
 </file>
 
-<file path=ppt/slides/slide13.xml><?xml version="1.0" encoding="utf-8"?>
+<file path=ppt/slides/slide14.xml><?xml version="1.0" encoding="utf-8"?>
 <p:sld xmlns:a="http://schemas.openxmlformats.org/drawingml/2006/main" xmlns:r="http://schemas.openxmlformats.org/officeDocument/2006/relationships" xmlns:p="http://schemas.openxmlformats.org/presentationml/2006/main">
   <p:cSld>
     <p:spTree>
@@ -10109,7 +10388,7 @@
 </p:sld>
 </file>
 
-<file path=ppt/slides/slide14.xml><?xml version="1.0" encoding="utf-8"?>
+<file path=ppt/slides/slide15.xml><?xml version="1.0" encoding="utf-8"?>
 <p:sld xmlns:a="http://schemas.openxmlformats.org/drawingml/2006/main" xmlns:r="http://schemas.openxmlformats.org/officeDocument/2006/relationships" xmlns:p="http://schemas.openxmlformats.org/presentationml/2006/main">
   <p:cSld>
     <p:spTree>
@@ -10150,7 +10429,7 @@
             <a:fld id="{C014DD1E-5D91-48A3-AD6D-45FBA980D106}" type="slidenum">
               <a:rPr lang="en-US" smtClean="0"/>
               <a:pPr/>
-              <a:t>14</a:t>
+              <a:t>15</a:t>
             </a:fld>
             <a:endParaRPr lang="en-US" dirty="0"/>
           </a:p>
@@ -10400,7 +10679,7 @@
 </p:sld>
 </file>
 
-<file path=ppt/slides/slide15.xml><?xml version="1.0" encoding="utf-8"?>
+<file path=ppt/slides/slide16.xml><?xml version="1.0" encoding="utf-8"?>
 <p:sld xmlns:a="http://schemas.openxmlformats.org/drawingml/2006/main" xmlns:r="http://schemas.openxmlformats.org/officeDocument/2006/relationships" xmlns:p="http://schemas.openxmlformats.org/presentationml/2006/main">
   <p:cSld>
     <p:spTree>
@@ -10535,7 +10814,7 @@
             <a:fld id="{2BF067CD-8E6B-4360-9AA8-C5DF2A48A6D1}" type="slidenum">
               <a:rPr lang="en-US" smtClean="0"/>
               <a:pPr/>
-              <a:t>15</a:t>
+              <a:t>16</a:t>
             </a:fld>
             <a:endParaRPr lang="en-US" dirty="0"/>
           </a:p>
@@ -10722,7 +11001,7 @@
 </p:sld>
 </file>
 
-<file path=ppt/slides/slide16.xml><?xml version="1.0" encoding="utf-8"?>
+<file path=ppt/slides/slide17.xml><?xml version="1.0" encoding="utf-8"?>
 <p:sld xmlns:a="http://schemas.openxmlformats.org/drawingml/2006/main" xmlns:r="http://schemas.openxmlformats.org/officeDocument/2006/relationships" xmlns:p="http://schemas.openxmlformats.org/presentationml/2006/main">
   <p:cSld>
     <p:spTree>
@@ -10763,7 +11042,7 @@
             <a:fld id="{C014DD1E-5D91-48A3-AD6D-45FBA980D106}" type="slidenum">
               <a:rPr lang="en-US" smtClean="0"/>
               <a:pPr/>
-              <a:t>16</a:t>
+              <a:t>17</a:t>
             </a:fld>
             <a:endParaRPr lang="en-US" dirty="0"/>
           </a:p>

</xml_diff>